<commit_message>
switch event handler to event listener
</commit_message>
<xml_diff>
--- a/week06/week06.pptx
+++ b/week06/week06.pptx
@@ -223,7 +223,7 @@
             <a:fld id="{A97C8422-C8B8-4BC4-B711-60DC022E0201}" type="datetimeFigureOut">
               <a:rPr lang="en-US" smtClean="0"/>
               <a:pPr/>
-              <a:t>9/29/14</a:t>
+              <a:t>10/9/14</a:t>
             </a:fld>
             <a:endParaRPr lang="en-US"/>
           </a:p>
@@ -1632,7 +1632,7 @@
             <a:fld id="{6534EC56-5BE0-CF40-A0E9-9B07941CA105}" type="datetimeFigureOut">
               <a:rPr lang="en-US" smtClean="0"/>
               <a:pPr/>
-              <a:t>9/29/14</a:t>
+              <a:t>10/9/14</a:t>
             </a:fld>
             <a:endParaRPr lang="en-US"/>
           </a:p>
@@ -1966,7 +1966,7 @@
             <a:fld id="{6534EC56-5BE0-CF40-A0E9-9B07941CA105}" type="datetimeFigureOut">
               <a:rPr lang="en-US" smtClean="0"/>
               <a:pPr/>
-              <a:t>9/29/14</a:t>
+              <a:t>10/9/14</a:t>
             </a:fld>
             <a:endParaRPr lang="en-US"/>
           </a:p>
@@ -2300,7 +2300,7 @@
             <a:fld id="{6534EC56-5BE0-CF40-A0E9-9B07941CA105}" type="datetimeFigureOut">
               <a:rPr lang="en-US" smtClean="0"/>
               <a:pPr/>
-              <a:t>9/29/14</a:t>
+              <a:t>10/9/14</a:t>
             </a:fld>
             <a:endParaRPr lang="en-US"/>
           </a:p>
@@ -2634,7 +2634,7 @@
             <a:fld id="{6534EC56-5BE0-CF40-A0E9-9B07941CA105}" type="datetimeFigureOut">
               <a:rPr lang="en-US" smtClean="0"/>
               <a:pPr/>
-              <a:t>9/29/14</a:t>
+              <a:t>10/9/14</a:t>
             </a:fld>
             <a:endParaRPr lang="en-US"/>
           </a:p>
@@ -3325,7 +3325,7 @@
             <a:fld id="{6534EC56-5BE0-CF40-A0E9-9B07941CA105}" type="datetimeFigureOut">
               <a:rPr lang="en-US" smtClean="0"/>
               <a:pPr/>
-              <a:t>9/29/14</a:t>
+              <a:t>10/9/14</a:t>
             </a:fld>
             <a:endParaRPr lang="en-US"/>
           </a:p>
@@ -3506,7 +3506,7 @@
             <a:fld id="{6534EC56-5BE0-CF40-A0E9-9B07941CA105}" type="datetimeFigureOut">
               <a:rPr lang="en-US" smtClean="0"/>
               <a:pPr/>
-              <a:t>9/29/14</a:t>
+              <a:t>10/9/14</a:t>
             </a:fld>
             <a:endParaRPr lang="en-US"/>
           </a:p>
@@ -3682,7 +3682,7 @@
             <a:fld id="{6534EC56-5BE0-CF40-A0E9-9B07941CA105}" type="datetimeFigureOut">
               <a:rPr lang="en-US" smtClean="0"/>
               <a:pPr/>
-              <a:t>9/29/14</a:t>
+              <a:t>10/9/14</a:t>
             </a:fld>
             <a:endParaRPr lang="en-US"/>
           </a:p>
@@ -3932,7 +3932,7 @@
             <a:fld id="{6534EC56-5BE0-CF40-A0E9-9B07941CA105}" type="datetimeFigureOut">
               <a:rPr lang="en-US" smtClean="0"/>
               <a:pPr/>
-              <a:t>9/29/14</a:t>
+              <a:t>10/9/14</a:t>
             </a:fld>
             <a:endParaRPr lang="en-US"/>
           </a:p>
@@ -4264,7 +4264,7 @@
             <a:fld id="{6534EC56-5BE0-CF40-A0E9-9B07941CA105}" type="datetimeFigureOut">
               <a:rPr lang="en-US" smtClean="0"/>
               <a:pPr/>
-              <a:t>9/29/14</a:t>
+              <a:t>10/9/14</a:t>
             </a:fld>
             <a:endParaRPr lang="en-US"/>
           </a:p>
@@ -4558,7 +4558,7 @@
             <a:fld id="{6534EC56-5BE0-CF40-A0E9-9B07941CA105}" type="datetimeFigureOut">
               <a:rPr lang="en-US" smtClean="0"/>
               <a:pPr/>
-              <a:t>9/29/14</a:t>
+              <a:t>10/9/14</a:t>
             </a:fld>
             <a:endParaRPr lang="en-US"/>
           </a:p>
@@ -4996,7 +4996,7 @@
             <a:fld id="{6534EC56-5BE0-CF40-A0E9-9B07941CA105}" type="datetimeFigureOut">
               <a:rPr lang="en-US" smtClean="0"/>
               <a:pPr/>
-              <a:t>9/29/14</a:t>
+              <a:t>10/9/14</a:t>
             </a:fld>
             <a:endParaRPr lang="en-US"/>
           </a:p>
@@ -5185,7 +5185,7 @@
             <a:fld id="{6534EC56-5BE0-CF40-A0E9-9B07941CA105}" type="datetimeFigureOut">
               <a:rPr lang="en-US" smtClean="0"/>
               <a:pPr/>
-              <a:t>9/29/14</a:t>
+              <a:t>10/9/14</a:t>
             </a:fld>
             <a:endParaRPr lang="en-US"/>
           </a:p>
@@ -5277,7 +5277,7 @@
             <a:fld id="{6534EC56-5BE0-CF40-A0E9-9B07941CA105}" type="datetimeFigureOut">
               <a:rPr lang="en-US" smtClean="0"/>
               <a:pPr/>
-              <a:t>9/29/14</a:t>
+              <a:t>10/9/14</a:t>
             </a:fld>
             <a:endParaRPr lang="en-US"/>
           </a:p>
@@ -5560,7 +5560,7 @@
             <a:fld id="{6534EC56-5BE0-CF40-A0E9-9B07941CA105}" type="datetimeFigureOut">
               <a:rPr lang="en-US" smtClean="0"/>
               <a:pPr/>
-              <a:t>9/29/14</a:t>
+              <a:t>10/9/14</a:t>
             </a:fld>
             <a:endParaRPr lang="en-US"/>
           </a:p>
@@ -5783,7 +5783,7 @@
             <a:fld id="{6534EC56-5BE0-CF40-A0E9-9B07941CA105}" type="datetimeFigureOut">
               <a:rPr lang="en-US" smtClean="0"/>
               <a:pPr/>
-              <a:t>9/29/14</a:t>
+              <a:t>10/9/14</a:t>
             </a:fld>
             <a:endParaRPr lang="en-US"/>
           </a:p>
@@ -6276,19 +6276,7 @@
           <a:p>
             <a:r>
               <a:rPr lang="en-US" dirty="0" smtClean="0"/>
-              <a:t>Events, "this", </a:t>
-            </a:r>
-            <a:r>
-              <a:rPr lang="en-US" dirty="0" smtClean="0"/>
-              <a:t>and</a:t>
-            </a:r>
-            <a:r>
-              <a:rPr lang="en-US" dirty="0" smtClean="0"/>
-              <a:t> </a:t>
-            </a:r>
-            <a:r>
-              <a:rPr lang="en-US" dirty="0" smtClean="0"/>
-              <a:t>P3</a:t>
+              <a:t>Events, "this", and P3</a:t>
             </a:r>
             <a:endParaRPr lang="en-US" dirty="0"/>
           </a:p>
@@ -6317,11 +6305,7 @@
           <a:p>
             <a:r>
               <a:rPr lang="en-US" dirty="0" smtClean="0"/>
-              <a:t>10</a:t>
-            </a:r>
-            <a:r>
-              <a:rPr lang="en-US" dirty="0" smtClean="0"/>
-              <a:t>/2</a:t>
+              <a:t>10/2</a:t>
             </a:r>
             <a:endParaRPr lang="en-US" dirty="0"/>
           </a:p>
@@ -6383,11 +6367,7 @@
           <a:p>
             <a:r>
               <a:rPr lang="en-US" dirty="0" smtClean="0"/>
-              <a:t>S3: </a:t>
-            </a:r>
-            <a:r>
-              <a:rPr lang="en-US" dirty="0" smtClean="0"/>
-              <a:t>Constructor</a:t>
+              <a:t>S3: Constructor</a:t>
             </a:r>
             <a:endParaRPr lang="en-US" dirty="0"/>
           </a:p>
@@ -6487,14 +6467,7 @@
                 <a:latin typeface="Courier New"/>
                 <a:cs typeface="Courier New"/>
               </a:rPr>
-              <a:t> = r</a:t>
-            </a:r>
-            <a:r>
-              <a:rPr lang="en-US" sz="2400" dirty="0" smtClean="0">
-                <a:latin typeface="Courier New"/>
-                <a:cs typeface="Courier New"/>
-              </a:rPr>
-              <a:t>;</a:t>
+              <a:t> = r;</a:t>
             </a:r>
           </a:p>
           <a:p>
@@ -6530,21 +6503,7 @@
                 <a:latin typeface="Courier New"/>
                 <a:cs typeface="Courier New"/>
               </a:rPr>
-              <a:t> </a:t>
-            </a:r>
-            <a:r>
-              <a:rPr lang="en-US" sz="2400" dirty="0" smtClean="0">
-                <a:latin typeface="Courier New"/>
-                <a:cs typeface="Courier New"/>
-              </a:rPr>
-              <a:t>= g</a:t>
-            </a:r>
-            <a:r>
-              <a:rPr lang="en-US" sz="2400" dirty="0" smtClean="0">
-                <a:latin typeface="Courier New"/>
-                <a:cs typeface="Courier New"/>
-              </a:rPr>
-              <a:t>;</a:t>
+              <a:t> = g;</a:t>
             </a:r>
           </a:p>
           <a:p>
@@ -6580,14 +6539,7 @@
                 <a:latin typeface="Courier New"/>
                 <a:cs typeface="Courier New"/>
               </a:rPr>
-              <a:t> </a:t>
-            </a:r>
-            <a:r>
-              <a:rPr lang="en-US" sz="2400" dirty="0" smtClean="0">
-                <a:latin typeface="Courier New"/>
-                <a:cs typeface="Courier New"/>
-              </a:rPr>
-              <a:t>= b;</a:t>
+              <a:t> = b;</a:t>
             </a:r>
           </a:p>
           <a:p>
@@ -6725,11 +6677,7 @@
           <a:p>
             <a:r>
               <a:rPr lang="en-US" dirty="0" smtClean="0"/>
-              <a:t>S3: </a:t>
-            </a:r>
-            <a:r>
-              <a:rPr lang="en-US" dirty="0" smtClean="0"/>
-              <a:t>Constructor</a:t>
+              <a:t>S3: Constructor</a:t>
             </a:r>
             <a:endParaRPr lang="en-US" dirty="0"/>
           </a:p>
@@ -6829,14 +6777,7 @@
                 <a:latin typeface="Courier New"/>
                 <a:cs typeface="Courier New"/>
               </a:rPr>
-              <a:t> = r</a:t>
-            </a:r>
-            <a:r>
-              <a:rPr lang="en-US" sz="2400" dirty="0" smtClean="0">
-                <a:latin typeface="Courier New"/>
-                <a:cs typeface="Courier New"/>
-              </a:rPr>
-              <a:t>;</a:t>
+              <a:t> = r;</a:t>
             </a:r>
           </a:p>
           <a:p>
@@ -6872,21 +6813,7 @@
                 <a:latin typeface="Courier New"/>
                 <a:cs typeface="Courier New"/>
               </a:rPr>
-              <a:t> </a:t>
-            </a:r>
-            <a:r>
-              <a:rPr lang="en-US" sz="2400" dirty="0" smtClean="0">
-                <a:latin typeface="Courier New"/>
-                <a:cs typeface="Courier New"/>
-              </a:rPr>
-              <a:t>= g</a:t>
-            </a:r>
-            <a:r>
-              <a:rPr lang="en-US" sz="2400" dirty="0" smtClean="0">
-                <a:latin typeface="Courier New"/>
-                <a:cs typeface="Courier New"/>
-              </a:rPr>
-              <a:t>;</a:t>
+              <a:t> = g;</a:t>
             </a:r>
           </a:p>
           <a:p>
@@ -6922,14 +6849,7 @@
                 <a:latin typeface="Courier New"/>
                 <a:cs typeface="Courier New"/>
               </a:rPr>
-              <a:t> </a:t>
-            </a:r>
-            <a:r>
-              <a:rPr lang="en-US" sz="2400" dirty="0" smtClean="0">
-                <a:latin typeface="Courier New"/>
-                <a:cs typeface="Courier New"/>
-              </a:rPr>
-              <a:t>= b;</a:t>
+              <a:t> = b;</a:t>
             </a:r>
           </a:p>
           <a:p>
@@ -7135,11 +7055,7 @@
           <a:p>
             <a:r>
               <a:rPr lang="en-US" dirty="0" smtClean="0"/>
-              <a:t>S3: </a:t>
-            </a:r>
-            <a:r>
-              <a:rPr lang="en-US" dirty="0" smtClean="0"/>
-              <a:t>Constructor</a:t>
+              <a:t>S3: Constructor</a:t>
             </a:r>
             <a:endParaRPr lang="en-US" dirty="0"/>
           </a:p>
@@ -7239,14 +7155,7 @@
                 <a:latin typeface="Courier New"/>
                 <a:cs typeface="Courier New"/>
               </a:rPr>
-              <a:t> = r</a:t>
-            </a:r>
-            <a:r>
-              <a:rPr lang="en-US" sz="2400" dirty="0" smtClean="0">
-                <a:latin typeface="Courier New"/>
-                <a:cs typeface="Courier New"/>
-              </a:rPr>
-              <a:t>;</a:t>
+              <a:t> = r;</a:t>
             </a:r>
           </a:p>
           <a:p>
@@ -7282,21 +7191,7 @@
                 <a:latin typeface="Courier New"/>
                 <a:cs typeface="Courier New"/>
               </a:rPr>
-              <a:t> </a:t>
-            </a:r>
-            <a:r>
-              <a:rPr lang="en-US" sz="2400" dirty="0" smtClean="0">
-                <a:latin typeface="Courier New"/>
-                <a:cs typeface="Courier New"/>
-              </a:rPr>
-              <a:t>= g</a:t>
-            </a:r>
-            <a:r>
-              <a:rPr lang="en-US" sz="2400" dirty="0" smtClean="0">
-                <a:latin typeface="Courier New"/>
-                <a:cs typeface="Courier New"/>
-              </a:rPr>
-              <a:t>;</a:t>
+              <a:t> = g;</a:t>
             </a:r>
           </a:p>
           <a:p>
@@ -7332,14 +7227,7 @@
                 <a:latin typeface="Courier New"/>
                 <a:cs typeface="Courier New"/>
               </a:rPr>
-              <a:t> </a:t>
-            </a:r>
-            <a:r>
-              <a:rPr lang="en-US" sz="2400" dirty="0" smtClean="0">
-                <a:latin typeface="Courier New"/>
-                <a:cs typeface="Courier New"/>
-              </a:rPr>
-              <a:t>= b;</a:t>
+              <a:t> = b;</a:t>
             </a:r>
           </a:p>
           <a:p>
@@ -7886,8 +7774,17 @@
             </a:r>
             <a:r>
               <a:rPr lang="en-US" dirty="0" smtClean="0"/>
-              <a:t> is called an ‘event handler’</a:t>
-            </a:r>
+              <a:t> is called an ‘event </a:t>
+            </a:r>
+            <a:r>
+              <a:rPr lang="en-US" dirty="0" smtClean="0"/>
+              <a:t>listen</a:t>
+            </a:r>
+            <a:r>
+              <a:rPr lang="en-US" dirty="0" smtClean="0"/>
+              <a:t>er’ (or "event handler" but use "listener" so you don't get confused)</a:t>
+            </a:r>
+            <a:endParaRPr lang="en-US" dirty="0" smtClean="0"/>
           </a:p>
           <a:p>
             <a:pPr lvl="1"/>
@@ -8394,15 +8291,7 @@
           <a:p>
             <a:r>
               <a:rPr lang="en-US" dirty="0" smtClean="0"/>
-              <a:t>There are w</a:t>
-            </a:r>
-            <a:r>
-              <a:rPr lang="en-US" dirty="0" smtClean="0"/>
-              <a:t>ays </a:t>
-            </a:r>
-            <a:r>
-              <a:rPr lang="en-US" dirty="0" smtClean="0"/>
-              <a:t>to manipulate the </a:t>
+              <a:t>There are ways to manipulate the </a:t>
             </a:r>
             <a:r>
               <a:rPr lang="en-US" dirty="0" smtClean="0">
@@ -8605,15 +8494,7 @@
           <a:p>
             <a:r>
               <a:rPr lang="en-US" dirty="0" smtClean="0"/>
-              <a:t>There are w</a:t>
-            </a:r>
-            <a:r>
-              <a:rPr lang="en-US" dirty="0" smtClean="0"/>
-              <a:t>ays </a:t>
-            </a:r>
-            <a:r>
-              <a:rPr lang="en-US" dirty="0" smtClean="0"/>
-              <a:t>to manipulate the </a:t>
+              <a:t>There are ways to manipulate the </a:t>
             </a:r>
             <a:r>
               <a:rPr lang="en-US" dirty="0" smtClean="0">
@@ -8958,15 +8839,7 @@
           <a:p>
             <a:r>
               <a:rPr lang="en-US" dirty="0" smtClean="0"/>
-              <a:t>There are w</a:t>
-            </a:r>
-            <a:r>
-              <a:rPr lang="en-US" dirty="0" smtClean="0"/>
-              <a:t>ays </a:t>
-            </a:r>
-            <a:r>
-              <a:rPr lang="en-US" dirty="0" smtClean="0"/>
-              <a:t>to manipulate the </a:t>
+              <a:t>There are ways to manipulate the </a:t>
             </a:r>
             <a:r>
               <a:rPr lang="en-US" dirty="0" smtClean="0">
@@ -9369,38 +9242,30 @@
           <a:p>
             <a:r>
               <a:rPr lang="en-US" dirty="0" smtClean="0"/>
-              <a:t>P2 is </a:t>
-            </a:r>
+              <a:t>P2 is in</a:t>
+            </a:r>
+            <a:endParaRPr lang="en-US" u="sng" dirty="0"/>
+          </a:p>
+        </p:txBody>
+      </p:sp>
+      <p:sp>
+        <p:nvSpPr>
+          <p:cNvPr id="3" name="Content Placeholder 2"/>
+          <p:cNvSpPr>
+            <a:spLocks noGrp="1"/>
+          </p:cNvSpPr>
+          <p:nvPr>
+            <p:ph idx="1"/>
+          </p:nvPr>
+        </p:nvSpPr>
+        <p:spPr/>
+        <p:txBody>
+          <a:bodyPr/>
+          <a:lstStyle/>
+          <a:p>
             <a:r>
               <a:rPr lang="en-US" dirty="0" smtClean="0"/>
-              <a:t>in</a:t>
-            </a:r>
-            <a:endParaRPr lang="en-US" u="sng" dirty="0"/>
-          </a:p>
-        </p:txBody>
-      </p:sp>
-      <p:sp>
-        <p:nvSpPr>
-          <p:cNvPr id="3" name="Content Placeholder 2"/>
-          <p:cNvSpPr>
-            <a:spLocks noGrp="1"/>
-          </p:cNvSpPr>
-          <p:nvPr>
-            <p:ph idx="1"/>
-          </p:nvPr>
-        </p:nvSpPr>
-        <p:spPr/>
-        <p:txBody>
-          <a:bodyPr/>
-          <a:lstStyle/>
-          <a:p>
-            <a:r>
-              <a:rPr lang="en-US" dirty="0" smtClean="0"/>
-              <a:t>Questions </a:t>
-            </a:r>
-            <a:r>
-              <a:rPr lang="en-US" dirty="0" smtClean="0"/>
-              <a:t>about P2?</a:t>
+              <a:t>Questions about P2?</a:t>
             </a:r>
           </a:p>
           <a:p>
@@ -10177,7 +10042,7 @@
                 <a:latin typeface="Courier New"/>
                 <a:cs typeface="Courier New"/>
               </a:rPr>
-              <a:t>addEventHandler</a:t>
+              <a:t>addEventListener</a:t>
             </a:r>
             <a:r>
               <a:rPr lang="en-US" dirty="0" smtClean="0">
@@ -10681,7 +10546,7 @@
                 <a:latin typeface="Courier New"/>
                 <a:cs typeface="Courier New"/>
               </a:rPr>
-              <a:t>addEventHandler</a:t>
+              <a:t>addEventListener</a:t>
             </a:r>
             <a:r>
               <a:rPr lang="en-US" dirty="0" smtClean="0">
@@ -10862,11 +10727,7 @@
             </a:r>
             <a:r>
               <a:rPr lang="en-US" dirty="0" smtClean="0"/>
-              <a:t>: </a:t>
-            </a:r>
-            <a:r>
-              <a:rPr lang="en-US" dirty="0" smtClean="0"/>
-              <a:t>mouse went over the event.</a:t>
+              <a:t>: mouse went over the event.</a:t>
             </a:r>
           </a:p>
           <a:p>
@@ -12262,14 +12123,7 @@
                 <a:latin typeface="Courier New"/>
                 <a:cs typeface="Courier New"/>
               </a:rPr>
-              <a:t>(“click”, function(event) </a:t>
-            </a:r>
-            <a:r>
-              <a:rPr lang="en-US" sz="1800" dirty="0" smtClean="0">
-                <a:latin typeface="Courier New"/>
-                <a:cs typeface="Courier New"/>
-              </a:rPr>
-              <a:t>{</a:t>
+              <a:t>(“click”, function(event) {</a:t>
             </a:r>
             <a:r>
               <a:rPr lang="en-US" sz="1800" dirty="0">
@@ -12672,14 +12526,7 @@
                 <a:latin typeface="Courier New"/>
                 <a:cs typeface="Courier New"/>
               </a:rPr>
-              <a:t>(“click”, function(event) </a:t>
-            </a:r>
-            <a:r>
-              <a:rPr lang="en-US" sz="1800" dirty="0" smtClean="0">
-                <a:latin typeface="Courier New"/>
-                <a:cs typeface="Courier New"/>
-              </a:rPr>
-              <a:t>{</a:t>
+              <a:t>(“click”, function(event) {</a:t>
             </a:r>
             <a:r>
               <a:rPr lang="en-US" sz="1800" dirty="0">
@@ -13260,19 +13107,8 @@
                 <a:latin typeface="Courier New"/>
                 <a:cs typeface="Courier New"/>
               </a:rPr>
-              <a:t>(“click”, function(event) </a:t>
-            </a:r>
-            <a:r>
-              <a:rPr lang="en-US" sz="1800" dirty="0" smtClean="0">
-                <a:latin typeface="Courier New"/>
-                <a:cs typeface="Courier New"/>
-              </a:rPr>
-              <a:t>{</a:t>
-            </a:r>
-            <a:endParaRPr lang="en-US" sz="1800" dirty="0" smtClean="0">
-              <a:latin typeface="Courier New"/>
-              <a:cs typeface="Courier New"/>
-            </a:endParaRPr>
+              <a:t>(“click”, function(event) {</a:t>
+            </a:r>
           </a:p>
           <a:p>
             <a:pPr marL="0" indent="0">
@@ -13651,22 +13487,13 @@
           <a:p>
             <a:r>
               <a:rPr lang="en-US" dirty="0" smtClean="0"/>
-              <a:t>Due </a:t>
-            </a:r>
+              <a:t>Due Wednesday October 22 at 8pm</a:t>
+            </a:r>
+          </a:p>
+          <a:p>
             <a:r>
               <a:rPr lang="en-US" dirty="0" smtClean="0"/>
-              <a:t>Wednesday October 22 at 8pm</a:t>
-            </a:r>
-            <a:endParaRPr lang="en-US" dirty="0" smtClean="0"/>
-          </a:p>
-          <a:p>
-            <a:r>
-              <a:rPr lang="en-US" dirty="0" smtClean="0"/>
-              <a:t>Will </a:t>
-            </a:r>
-            <a:r>
-              <a:rPr lang="en-US" dirty="0" smtClean="0"/>
-              <a:t>discuss in more detail later…</a:t>
+              <a:t>Will discuss in more detail later…</a:t>
             </a:r>
             <a:endParaRPr lang="en-US" dirty="0"/>
           </a:p>
@@ -14275,11 +14102,7 @@
           <a:p>
             <a:r>
               <a:rPr lang="en-US" dirty="0" smtClean="0"/>
-              <a:t>the </a:t>
-            </a:r>
-            <a:r>
-              <a:rPr lang="en-US" dirty="0" smtClean="0"/>
-              <a:t>“this” keyword</a:t>
+              <a:t>the “this” keyword</a:t>
             </a:r>
           </a:p>
           <a:p>
@@ -14429,7 +14252,15 @@
             </a:r>
             <a:r>
               <a:rPr lang="en-US" dirty="0" smtClean="0"/>
-              <a:t>handler (haven't covered this "this" yet)</a:t>
+              <a:t>Listen</a:t>
+            </a:r>
+            <a:r>
+              <a:rPr lang="en-US" dirty="0" smtClean="0"/>
+              <a:t>er </a:t>
+            </a:r>
+            <a:r>
+              <a:rPr lang="en-US" dirty="0" smtClean="0"/>
+              <a:t>(haven't covered this "this" yet)</a:t>
             </a:r>
             <a:endParaRPr lang="en-US" dirty="0"/>
           </a:p>
@@ -15252,7 +15083,6 @@
               <a:rPr lang="en-US" dirty="0"/>
               <a:t>S2: Function Call (without new)</a:t>
             </a:r>
-            <a:endParaRPr lang="en-US" dirty="0"/>
           </a:p>
         </p:txBody>
       </p:sp>
@@ -15440,15 +15270,7 @@
           <a:p>
             <a:r>
               <a:rPr lang="en-US" dirty="0" smtClean="0"/>
-              <a:t>S2: </a:t>
-            </a:r>
-            <a:r>
-              <a:rPr lang="en-US" dirty="0" smtClean="0"/>
-              <a:t>Function </a:t>
-            </a:r>
-            <a:r>
-              <a:rPr lang="en-US" dirty="0" smtClean="0"/>
-              <a:t>Call (without new)</a:t>
+              <a:t>S2: Function Call (without new)</a:t>
             </a:r>
             <a:endParaRPr lang="en-US" dirty="0"/>
           </a:p>

</xml_diff>